<commit_message>
Updated slides with Cy3 release URL
</commit_message>
<xml_diff>
--- a/slides.pptx
+++ b/slides.pptx
@@ -17199,48 +17199,34 @@
           <a:p>
             <a:pPr lvl="1"/>
             <a:r>
-              <a:rPr lang="en-US" dirty="0" smtClean="0"/>
-              <a:t>TBD</a:t>
-            </a:r>
-            <a:endParaRPr lang="en-US" dirty="0" smtClean="0"/>
-          </a:p>
-          <a:p>
-            <a:r>
-              <a:rPr lang="en-US" dirty="0" smtClean="0"/>
-              <a:t>Maven </a:t>
-            </a:r>
-            <a:r>
-              <a:rPr lang="en-US" dirty="0" smtClean="0"/>
-              <a:t>3.0</a:t>
-            </a:r>
-          </a:p>
-          <a:p>
-            <a:pPr lvl="1"/>
-            <a:r>
-              <a:rPr lang="en-US" dirty="0" smtClean="0"/>
-              <a:t>Build system</a:t>
-            </a:r>
-          </a:p>
-          <a:p>
-            <a:pPr lvl="1"/>
-            <a:r>
               <a:rPr lang="en-US" dirty="0">
                 <a:hlinkClick r:id="rId2"/>
               </a:rPr>
-              <a:t>http://maven.apache.org/</a:t>
+              <a:t>http://chianti.ucsd.edu/cytoscape-3.0.0</a:t>
             </a:r>
             <a:r>
               <a:rPr lang="en-US" dirty="0" smtClean="0">
                 <a:hlinkClick r:id="rId2"/>
               </a:rPr>
-              <a:t>download.html</a:t>
+              <a:t>/</a:t>
             </a:r>
             <a:endParaRPr lang="en-US" dirty="0" smtClean="0"/>
           </a:p>
           <a:p>
             <a:r>
               <a:rPr lang="en-US" dirty="0" smtClean="0"/>
-              <a:t>Starter code</a:t>
+              <a:t>Maven </a:t>
+            </a:r>
+            <a:r>
+              <a:rPr lang="en-US" dirty="0" smtClean="0"/>
+              <a:t>3.0</a:t>
+            </a:r>
+          </a:p>
+          <a:p>
+            <a:pPr lvl="1"/>
+            <a:r>
+              <a:rPr lang="en-US" dirty="0" smtClean="0"/>
+              <a:t>Build system</a:t>
             </a:r>
           </a:p>
           <a:p>
@@ -17249,11 +17235,33 @@
               <a:rPr lang="en-US" dirty="0">
                 <a:hlinkClick r:id="rId3"/>
               </a:rPr>
-              <a:t>http://tinyurl.com/cy3-</a:t>
+              <a:t>http://maven.apache.org/</a:t>
             </a:r>
             <a:r>
               <a:rPr lang="en-US" dirty="0" smtClean="0">
                 <a:hlinkClick r:id="rId3"/>
+              </a:rPr>
+              <a:t>download.html</a:t>
+            </a:r>
+            <a:endParaRPr lang="en-US" dirty="0" smtClean="0"/>
+          </a:p>
+          <a:p>
+            <a:r>
+              <a:rPr lang="en-US" dirty="0" smtClean="0"/>
+              <a:t>Starter code</a:t>
+            </a:r>
+          </a:p>
+          <a:p>
+            <a:pPr lvl="1"/>
+            <a:r>
+              <a:rPr lang="en-US" dirty="0">
+                <a:hlinkClick r:id="rId4"/>
+              </a:rPr>
+              <a:t>http://tinyurl.com/cy3-</a:t>
+            </a:r>
+            <a:r>
+              <a:rPr lang="en-US" dirty="0" smtClean="0">
+                <a:hlinkClick r:id="rId4"/>
               </a:rPr>
               <a:t>tutorial</a:t>
             </a:r>
@@ -22073,16 +22081,12 @@
           <a:p>
             <a:pPr lvl="1"/>
             <a:r>
-              <a:rPr lang="en-US" smtClean="0"/>
+              <a:rPr lang="en-US" dirty="0" smtClean="0"/>
               <a:t>M</a:t>
             </a:r>
             <a:r>
-              <a:rPr lang="en-US" smtClean="0"/>
-              <a:t>ap “</a:t>
-            </a:r>
-            <a:r>
               <a:rPr lang="en-US" dirty="0" smtClean="0"/>
-              <a:t>reachable” column to </a:t>
+              <a:t>ap “reachable” column to </a:t>
             </a:r>
             <a:r>
               <a:rPr lang="en-US" dirty="0" err="1" smtClean="0"/>

</xml_diff>